<commit_message>
updated scrum.xlsx and pres.pptx after last scrum meeting
</commit_message>
<xml_diff>
--- a/doc/07-PresentationOfToolInEntireBeauty/pres.pptx
+++ b/doc/07-PresentationOfToolInEntireBeauty/pres.pptx
@@ -257,7 +257,7 @@
               <a:pPr>
                 <a:defRPr/>
               </a:pPr>
-              <a:t>16.01.18</a:t>
+              <a:t>18.01.18</a:t>
             </a:fld>
             <a:endParaRPr lang="de-CH" dirty="0"/>
           </a:p>
@@ -565,6 +565,104 @@
 </p:notesMaster>
 </file>
 
+<file path=ppt/notesSlides/notesSlide1.xml><?xml version="1.0" encoding="utf-8"?>
+<p:notes xmlns:a="http://schemas.openxmlformats.org/drawingml/2006/main" xmlns:r="http://schemas.openxmlformats.org/officeDocument/2006/relationships" xmlns:p="http://schemas.openxmlformats.org/presentationml/2006/main">
+  <p:cSld>
+    <p:spTree>
+      <p:nvGrpSpPr>
+        <p:cNvPr id="1" name=""/>
+        <p:cNvGrpSpPr/>
+        <p:nvPr/>
+      </p:nvGrpSpPr>
+      <p:grpSpPr>
+        <a:xfrm>
+          <a:off x="0" y="0"/>
+          <a:ext cx="0" cy="0"/>
+          <a:chOff x="0" y="0"/>
+          <a:chExt cx="0" cy="0"/>
+        </a:xfrm>
+      </p:grpSpPr>
+      <p:sp>
+        <p:nvSpPr>
+          <p:cNvPr id="2" name="Slide Image Placeholder 1"/>
+          <p:cNvSpPr>
+            <a:spLocks noGrp="1" noRot="1" noChangeAspect="1"/>
+          </p:cNvSpPr>
+          <p:nvPr>
+            <p:ph type="sldImg"/>
+          </p:nvPr>
+        </p:nvSpPr>
+        <p:spPr/>
+      </p:sp>
+      <p:sp>
+        <p:nvSpPr>
+          <p:cNvPr id="3" name="Notes Placeholder 2"/>
+          <p:cNvSpPr>
+            <a:spLocks noGrp="1"/>
+          </p:cNvSpPr>
+          <p:nvPr>
+            <p:ph type="body" idx="1"/>
+          </p:nvPr>
+        </p:nvSpPr>
+        <p:spPr/>
+        <p:txBody>
+          <a:bodyPr/>
+          <a:lstStyle/>
+          <a:p>
+            <a:r>
+              <a:rPr lang="de-CH" dirty="0" smtClean="0"/>
+              <a:t>-</a:t>
+            </a:r>
+            <a:r>
+              <a:rPr lang="de-CH" baseline="0" dirty="0" smtClean="0"/>
+              <a:t> ca. 7min</a:t>
+            </a:r>
+            <a:endParaRPr lang="de-CH" dirty="0"/>
+          </a:p>
+        </p:txBody>
+      </p:sp>
+      <p:sp>
+        <p:nvSpPr>
+          <p:cNvPr id="4" name="Slide Number Placeholder 3"/>
+          <p:cNvSpPr>
+            <a:spLocks noGrp="1"/>
+          </p:cNvSpPr>
+          <p:nvPr>
+            <p:ph type="sldNum" sz="quarter" idx="10"/>
+          </p:nvPr>
+        </p:nvSpPr>
+        <p:spPr/>
+        <p:txBody>
+          <a:bodyPr/>
+          <a:lstStyle/>
+          <a:p>
+            <a:pPr>
+              <a:defRPr/>
+            </a:pPr>
+            <a:fld id="{EE3A4D74-8AB3-4782-8193-8B0B8D7F57EA}" type="slidenum">
+              <a:rPr lang="de-CH" smtClean="0"/>
+              <a:pPr>
+                <a:defRPr/>
+              </a:pPr>
+              <a:t>2</a:t>
+            </a:fld>
+            <a:endParaRPr lang="de-CH" dirty="0"/>
+          </a:p>
+        </p:txBody>
+      </p:sp>
+    </p:spTree>
+    <p:extLst>
+      <p:ext uri="{BB962C8B-B14F-4D97-AF65-F5344CB8AC3E}">
+        <p14:creationId xmlns:p14="http://schemas.microsoft.com/office/powerpoint/2010/main" val="1602680796"/>
+      </p:ext>
+    </p:extLst>
+  </p:cSld>
+  <p:clrMapOvr>
+    <a:masterClrMapping/>
+  </p:clrMapOvr>
+</p:notes>
+</file>
+
 <file path=ppt/slideLayouts/slideLayout1.xml><?xml version="1.0" encoding="utf-8"?>
 <p:sldLayout xmlns:a="http://schemas.openxmlformats.org/drawingml/2006/main" xmlns:r="http://schemas.openxmlformats.org/officeDocument/2006/relationships" xmlns:p="http://schemas.openxmlformats.org/presentationml/2006/main" preserve="1" userDrawn="1">
   <p:cSld name="Titelfolie mit Bild">
@@ -1192,7 +1290,7 @@
               <a:pPr>
                 <a:defRPr/>
               </a:pPr>
-              <a:t>16.01.18</a:t>
+              <a:t>18.01.18</a:t>
             </a:fld>
             <a:r>
               <a:rPr lang="de-DE" sz="1000" dirty="0"/>
@@ -2629,7 +2727,7 @@
               <a:pPr>
                 <a:defRPr/>
               </a:pPr>
-              <a:t>16.01.18</a:t>
+              <a:t>18.01.18</a:t>
             </a:fld>
             <a:r>
               <a:rPr lang="de-DE" sz="1000" dirty="0"/>
@@ -6732,7 +6830,7 @@
           <p:cNvPr id="14" name="Grafik 13">
             <a:extLst>
               <a:ext uri="{FF2B5EF4-FFF2-40B4-BE49-F238E27FC236}">
-                <a16:creationId xmlns="" xmlns:a16="http://schemas.microsoft.com/office/drawing/2014/main" id="{2E9A2A1D-37DF-4512-A325-1061D0799F67}"/>
+                <a16:creationId xmlns:a16="http://schemas.microsoft.com/office/drawing/2014/main" xmlns="" id="{2E9A2A1D-37DF-4512-A325-1061D0799F67}"/>
               </a:ext>
             </a:extLst>
           </p:cNvPr>
@@ -7664,6 +7762,13 @@
   <p:clrMapOvr>
     <a:masterClrMapping/>
   </p:clrMapOvr>
+  <p:timing>
+    <p:tnLst>
+      <p:par>
+        <p:cTn id="1" dur="indefinite" restart="never" nodeType="tmRoot"/>
+      </p:par>
+    </p:tnLst>
+  </p:timing>
 </p:sld>
 </file>
 

</xml_diff>